<commit_message>
changed exercise 2 to use jabref
</commit_message>
<xml_diff>
--- a/docs/exercises/images/graphics.pptx
+++ b/docs/exercises/images/graphics.pptx
@@ -6,6 +6,8 @@
   </p:sldMasterIdLst>
   <p:sldIdLst>
     <p:sldId id="256" r:id="rId2"/>
+    <p:sldId id="257" r:id="rId3"/>
+    <p:sldId id="258" r:id="rId4"/>
   </p:sldIdLst>
   <p:sldSz cx="12192000" cy="6858000"/>
   <p:notesSz cx="6858000" cy="9144000"/>
@@ -3613,15 +3615,15 @@
         </p:spPr>
         <p:style>
           <a:lnRef idx="2">
-            <a:schemeClr val="accent2">
+            <a:schemeClr val="accent3">
               <a:shade val="50000"/>
             </a:schemeClr>
           </a:lnRef>
           <a:fillRef idx="1">
-            <a:schemeClr val="accent2"/>
+            <a:schemeClr val="accent3"/>
           </a:fillRef>
           <a:effectRef idx="0">
-            <a:schemeClr val="accent2"/>
+            <a:schemeClr val="accent3"/>
           </a:effectRef>
           <a:fontRef idx="minor">
             <a:schemeClr val="lt1"/>
@@ -3718,15 +3720,15 @@
         </p:spPr>
         <p:style>
           <a:lnRef idx="2">
-            <a:schemeClr val="accent2">
+            <a:schemeClr val="accent3">
               <a:shade val="50000"/>
             </a:schemeClr>
           </a:lnRef>
           <a:fillRef idx="1">
-            <a:schemeClr val="accent2"/>
+            <a:schemeClr val="accent3"/>
           </a:fillRef>
           <a:effectRef idx="0">
-            <a:schemeClr val="accent2"/>
+            <a:schemeClr val="accent3"/>
           </a:effectRef>
           <a:fontRef idx="minor">
             <a:schemeClr val="lt1"/>
@@ -3951,6 +3953,234 @@
     <p:extLst>
       <p:ext uri="{BB962C8B-B14F-4D97-AF65-F5344CB8AC3E}">
         <p14:creationId xmlns:p14="http://schemas.microsoft.com/office/powerpoint/2010/main" val="2401719345"/>
+      </p:ext>
+    </p:extLst>
+  </p:cSld>
+  <p:clrMapOvr>
+    <a:masterClrMapping/>
+  </p:clrMapOvr>
+</p:sld>
+</file>
+
+<file path=ppt/slides/slide2.xml><?xml version="1.0" encoding="utf-8"?>
+<p:sld xmlns:a="http://schemas.openxmlformats.org/drawingml/2006/main" xmlns:r="http://schemas.openxmlformats.org/officeDocument/2006/relationships" xmlns:p="http://schemas.openxmlformats.org/presentationml/2006/main">
+  <p:cSld>
+    <p:spTree>
+      <p:nvGrpSpPr>
+        <p:cNvPr id="1" name=""/>
+        <p:cNvGrpSpPr/>
+        <p:nvPr/>
+      </p:nvGrpSpPr>
+      <p:grpSpPr>
+        <a:xfrm>
+          <a:off x="0" y="0"/>
+          <a:ext cx="0" cy="0"/>
+          <a:chOff x="0" y="0"/>
+          <a:chExt cx="0" cy="0"/>
+        </a:xfrm>
+      </p:grpSpPr>
+      <p:pic>
+        <p:nvPicPr>
+          <p:cNvPr id="2" name="Picture 1">
+            <a:extLst>
+              <a:ext uri="{FF2B5EF4-FFF2-40B4-BE49-F238E27FC236}">
+                <a16:creationId xmlns:a16="http://schemas.microsoft.com/office/drawing/2014/main" id="{7FB3D95E-52DD-43F3-9350-9319F5A01185}"/>
+              </a:ext>
+            </a:extLst>
+          </p:cNvPr>
+          <p:cNvPicPr>
+            <a:picLocks noChangeAspect="1"/>
+          </p:cNvPicPr>
+          <p:nvPr/>
+        </p:nvPicPr>
+        <p:blipFill>
+          <a:blip r:embed="rId2"/>
+          <a:stretch>
+            <a:fillRect/>
+          </a:stretch>
+        </p:blipFill>
+        <p:spPr>
+          <a:xfrm>
+            <a:off x="2871347" y="514032"/>
+            <a:ext cx="6717661" cy="5106479"/>
+          </a:xfrm>
+          <a:prstGeom prst="rect">
+            <a:avLst/>
+          </a:prstGeom>
+        </p:spPr>
+      </p:pic>
+      <p:sp>
+        <p:nvSpPr>
+          <p:cNvPr id="3" name="Oval 2">
+            <a:extLst>
+              <a:ext uri="{FF2B5EF4-FFF2-40B4-BE49-F238E27FC236}">
+                <a16:creationId xmlns:a16="http://schemas.microsoft.com/office/drawing/2014/main" id="{862E8D7C-3080-43BB-BA45-5022FDBAF897}"/>
+              </a:ext>
+            </a:extLst>
+          </p:cNvPr>
+          <p:cNvSpPr/>
+          <p:nvPr/>
+        </p:nvSpPr>
+        <p:spPr>
+          <a:xfrm>
+            <a:off x="5108448" y="2987040"/>
+            <a:ext cx="524256" cy="188976"/>
+          </a:xfrm>
+          <a:prstGeom prst="ellipse">
+            <a:avLst/>
+          </a:prstGeom>
+          <a:noFill/>
+          <a:ln w="9525" cap="flat" cmpd="sng" algn="ctr">
+            <a:solidFill>
+              <a:srgbClr val="FF0000"/>
+            </a:solidFill>
+            <a:prstDash val="solid"/>
+            <a:round/>
+            <a:headEnd type="none" w="med" len="med"/>
+            <a:tailEnd type="none" w="med" len="med"/>
+          </a:ln>
+        </p:spPr>
+        <p:style>
+          <a:lnRef idx="0">
+            <a:scrgbClr r="0" g="0" b="0"/>
+          </a:lnRef>
+          <a:fillRef idx="0">
+            <a:scrgbClr r="0" g="0" b="0"/>
+          </a:fillRef>
+          <a:effectRef idx="0">
+            <a:scrgbClr r="0" g="0" b="0"/>
+          </a:effectRef>
+          <a:fontRef idx="minor">
+            <a:schemeClr val="accent2"/>
+          </a:fontRef>
+        </p:style>
+        <p:txBody>
+          <a:bodyPr rtlCol="0" anchor="ctr"/>
+          <a:lstStyle/>
+          <a:p>
+            <a:pPr algn="ctr"/>
+            <a:endParaRPr lang="de-CH"/>
+          </a:p>
+        </p:txBody>
+      </p:sp>
+    </p:spTree>
+    <p:extLst>
+      <p:ext uri="{BB962C8B-B14F-4D97-AF65-F5344CB8AC3E}">
+        <p14:creationId xmlns:p14="http://schemas.microsoft.com/office/powerpoint/2010/main" val="1378081642"/>
+      </p:ext>
+    </p:extLst>
+  </p:cSld>
+  <p:clrMapOvr>
+    <a:masterClrMapping/>
+  </p:clrMapOvr>
+</p:sld>
+</file>
+
+<file path=ppt/slides/slide3.xml><?xml version="1.0" encoding="utf-8"?>
+<p:sld xmlns:a="http://schemas.openxmlformats.org/drawingml/2006/main" xmlns:r="http://schemas.openxmlformats.org/officeDocument/2006/relationships" xmlns:p="http://schemas.openxmlformats.org/presentationml/2006/main">
+  <p:cSld>
+    <p:spTree>
+      <p:nvGrpSpPr>
+        <p:cNvPr id="1" name=""/>
+        <p:cNvGrpSpPr/>
+        <p:nvPr/>
+      </p:nvGrpSpPr>
+      <p:grpSpPr>
+        <a:xfrm>
+          <a:off x="0" y="0"/>
+          <a:ext cx="0" cy="0"/>
+          <a:chOff x="0" y="0"/>
+          <a:chExt cx="0" cy="0"/>
+        </a:xfrm>
+      </p:grpSpPr>
+      <p:pic>
+        <p:nvPicPr>
+          <p:cNvPr id="2" name="Picture 1">
+            <a:extLst>
+              <a:ext uri="{FF2B5EF4-FFF2-40B4-BE49-F238E27FC236}">
+                <a16:creationId xmlns:a16="http://schemas.microsoft.com/office/drawing/2014/main" id="{59A4C5CF-036F-4352-8984-3AB881D8AD1D}"/>
+              </a:ext>
+            </a:extLst>
+          </p:cNvPr>
+          <p:cNvPicPr>
+            <a:picLocks noChangeAspect="1"/>
+          </p:cNvPicPr>
+          <p:nvPr/>
+        </p:nvPicPr>
+        <p:blipFill>
+          <a:blip r:embed="rId2"/>
+          <a:stretch>
+            <a:fillRect/>
+          </a:stretch>
+        </p:blipFill>
+        <p:spPr>
+          <a:xfrm>
+            <a:off x="3137256" y="528101"/>
+            <a:ext cx="5917487" cy="5801798"/>
+          </a:xfrm>
+          <a:prstGeom prst="rect">
+            <a:avLst/>
+          </a:prstGeom>
+        </p:spPr>
+      </p:pic>
+      <p:sp>
+        <p:nvSpPr>
+          <p:cNvPr id="3" name="Oval 2">
+            <a:extLst>
+              <a:ext uri="{FF2B5EF4-FFF2-40B4-BE49-F238E27FC236}">
+                <a16:creationId xmlns:a16="http://schemas.microsoft.com/office/drawing/2014/main" id="{F58DD03F-CE19-4519-9F68-6175947B5582}"/>
+              </a:ext>
+            </a:extLst>
+          </p:cNvPr>
+          <p:cNvSpPr/>
+          <p:nvPr/>
+        </p:nvSpPr>
+        <p:spPr>
+          <a:xfrm>
+            <a:off x="7729728" y="2328672"/>
+            <a:ext cx="1024128" cy="369162"/>
+          </a:xfrm>
+          <a:prstGeom prst="ellipse">
+            <a:avLst/>
+          </a:prstGeom>
+          <a:noFill/>
+          <a:ln w="9525" cap="flat" cmpd="sng" algn="ctr">
+            <a:solidFill>
+              <a:srgbClr val="FF0000"/>
+            </a:solidFill>
+            <a:prstDash val="solid"/>
+            <a:round/>
+            <a:headEnd type="none" w="med" len="med"/>
+            <a:tailEnd type="none" w="med" len="med"/>
+          </a:ln>
+        </p:spPr>
+        <p:style>
+          <a:lnRef idx="0">
+            <a:scrgbClr r="0" g="0" b="0"/>
+          </a:lnRef>
+          <a:fillRef idx="0">
+            <a:scrgbClr r="0" g="0" b="0"/>
+          </a:fillRef>
+          <a:effectRef idx="0">
+            <a:scrgbClr r="0" g="0" b="0"/>
+          </a:effectRef>
+          <a:fontRef idx="minor">
+            <a:schemeClr val="accent2"/>
+          </a:fontRef>
+        </p:style>
+        <p:txBody>
+          <a:bodyPr rtlCol="0" anchor="ctr"/>
+          <a:lstStyle/>
+          <a:p>
+            <a:pPr algn="ctr"/>
+            <a:endParaRPr lang="de-CH"/>
+          </a:p>
+        </p:txBody>
+      </p:sp>
+    </p:spTree>
+    <p:extLst>
+      <p:ext uri="{BB962C8B-B14F-4D97-AF65-F5344CB8AC3E}">
+        <p14:creationId xmlns:p14="http://schemas.microsoft.com/office/powerpoint/2010/main" val="516172382"/>
       </p:ext>
     </p:extLst>
   </p:cSld>

</xml_diff>

<commit_message>
added intellij workaround and java setup to setup document
</commit_message>
<xml_diff>
--- a/docs/exercises/images/graphics.pptx
+++ b/docs/exercises/images/graphics.pptx
@@ -8,6 +8,9 @@
     <p:sldId id="256" r:id="rId2"/>
     <p:sldId id="257" r:id="rId3"/>
     <p:sldId id="258" r:id="rId4"/>
+    <p:sldId id="259" r:id="rId5"/>
+    <p:sldId id="260" r:id="rId6"/>
+    <p:sldId id="261" r:id="rId7"/>
   </p:sldIdLst>
   <p:sldSz cx="12192000" cy="6858000"/>
   <p:notesSz cx="6858000" cy="9144000"/>
@@ -106,6 +109,11 @@
       </a:defRPr>
     </a:lvl9pPr>
   </p:defaultTextStyle>
+  <p:extLst>
+    <p:ext uri="{EFAFB233-063F-42B5-8137-9DF3F51BA10A}">
+      <p15:sldGuideLst xmlns:p15="http://schemas.microsoft.com/office/powerpoint/2012/main"/>
+    </p:ext>
+  </p:extLst>
 </p:presentation>
 </file>
 
@@ -258,7 +266,7 @@
           <a:p>
             <a:fld id="{59899A34-A68A-4635-85BD-0DF1564C194C}" type="datetimeFigureOut">
               <a:rPr lang="de-CH" smtClean="0"/>
-              <a:t>04.09.2019</a:t>
+              <a:t>05.09.2019</a:t>
             </a:fld>
             <a:endParaRPr lang="de-CH"/>
           </a:p>
@@ -458,7 +466,7 @@
           <a:p>
             <a:fld id="{59899A34-A68A-4635-85BD-0DF1564C194C}" type="datetimeFigureOut">
               <a:rPr lang="de-CH" smtClean="0"/>
-              <a:t>04.09.2019</a:t>
+              <a:t>05.09.2019</a:t>
             </a:fld>
             <a:endParaRPr lang="de-CH"/>
           </a:p>
@@ -668,7 +676,7 @@
           <a:p>
             <a:fld id="{59899A34-A68A-4635-85BD-0DF1564C194C}" type="datetimeFigureOut">
               <a:rPr lang="de-CH" smtClean="0"/>
-              <a:t>04.09.2019</a:t>
+              <a:t>05.09.2019</a:t>
             </a:fld>
             <a:endParaRPr lang="de-CH"/>
           </a:p>
@@ -868,7 +876,7 @@
           <a:p>
             <a:fld id="{59899A34-A68A-4635-85BD-0DF1564C194C}" type="datetimeFigureOut">
               <a:rPr lang="de-CH" smtClean="0"/>
-              <a:t>04.09.2019</a:t>
+              <a:t>05.09.2019</a:t>
             </a:fld>
             <a:endParaRPr lang="de-CH"/>
           </a:p>
@@ -1144,7 +1152,7 @@
           <a:p>
             <a:fld id="{59899A34-A68A-4635-85BD-0DF1564C194C}" type="datetimeFigureOut">
               <a:rPr lang="de-CH" smtClean="0"/>
-              <a:t>04.09.2019</a:t>
+              <a:t>05.09.2019</a:t>
             </a:fld>
             <a:endParaRPr lang="de-CH"/>
           </a:p>
@@ -1412,7 +1420,7 @@
           <a:p>
             <a:fld id="{59899A34-A68A-4635-85BD-0DF1564C194C}" type="datetimeFigureOut">
               <a:rPr lang="de-CH" smtClean="0"/>
-              <a:t>04.09.2019</a:t>
+              <a:t>05.09.2019</a:t>
             </a:fld>
             <a:endParaRPr lang="de-CH"/>
           </a:p>
@@ -1827,7 +1835,7 @@
           <a:p>
             <a:fld id="{59899A34-A68A-4635-85BD-0DF1564C194C}" type="datetimeFigureOut">
               <a:rPr lang="de-CH" smtClean="0"/>
-              <a:t>04.09.2019</a:t>
+              <a:t>05.09.2019</a:t>
             </a:fld>
             <a:endParaRPr lang="de-CH"/>
           </a:p>
@@ -1969,7 +1977,7 @@
           <a:p>
             <a:fld id="{59899A34-A68A-4635-85BD-0DF1564C194C}" type="datetimeFigureOut">
               <a:rPr lang="de-CH" smtClean="0"/>
-              <a:t>04.09.2019</a:t>
+              <a:t>05.09.2019</a:t>
             </a:fld>
             <a:endParaRPr lang="de-CH"/>
           </a:p>
@@ -2082,7 +2090,7 @@
           <a:p>
             <a:fld id="{59899A34-A68A-4635-85BD-0DF1564C194C}" type="datetimeFigureOut">
               <a:rPr lang="de-CH" smtClean="0"/>
-              <a:t>04.09.2019</a:t>
+              <a:t>05.09.2019</a:t>
             </a:fld>
             <a:endParaRPr lang="de-CH"/>
           </a:p>
@@ -2395,7 +2403,7 @@
           <a:p>
             <a:fld id="{59899A34-A68A-4635-85BD-0DF1564C194C}" type="datetimeFigureOut">
               <a:rPr lang="de-CH" smtClean="0"/>
-              <a:t>04.09.2019</a:t>
+              <a:t>05.09.2019</a:t>
             </a:fld>
             <a:endParaRPr lang="de-CH"/>
           </a:p>
@@ -2684,7 +2692,7 @@
           <a:p>
             <a:fld id="{59899A34-A68A-4635-85BD-0DF1564C194C}" type="datetimeFigureOut">
               <a:rPr lang="de-CH" smtClean="0"/>
-              <a:t>04.09.2019</a:t>
+              <a:t>05.09.2019</a:t>
             </a:fld>
             <a:endParaRPr lang="de-CH"/>
           </a:p>
@@ -2927,7 +2935,7 @@
           <a:p>
             <a:fld id="{59899A34-A68A-4635-85BD-0DF1564C194C}" type="datetimeFigureOut">
               <a:rPr lang="de-CH" smtClean="0"/>
-              <a:t>04.09.2019</a:t>
+              <a:t>05.09.2019</a:t>
             </a:fld>
             <a:endParaRPr lang="de-CH"/>
           </a:p>
@@ -3375,225 +3383,6 @@
       </p:pic>
       <p:sp>
         <p:nvSpPr>
-          <p:cNvPr id="5" name="Callout: Line 4">
-            <a:extLst>
-              <a:ext uri="{FF2B5EF4-FFF2-40B4-BE49-F238E27FC236}">
-                <a16:creationId xmlns:a16="http://schemas.microsoft.com/office/drawing/2014/main" id="{D9EDCC5D-96BD-4548-A877-A50503BBE3D9}"/>
-              </a:ext>
-            </a:extLst>
-          </p:cNvPr>
-          <p:cNvSpPr/>
-          <p:nvPr/>
-        </p:nvSpPr>
-        <p:spPr>
-          <a:xfrm>
-            <a:off x="1414272" y="3267456"/>
-            <a:ext cx="1524000" cy="438912"/>
-          </a:xfrm>
-          <a:prstGeom prst="borderCallout1">
-            <a:avLst/>
-          </a:prstGeom>
-        </p:spPr>
-        <p:style>
-          <a:lnRef idx="2">
-            <a:schemeClr val="accent2">
-              <a:shade val="50000"/>
-            </a:schemeClr>
-          </a:lnRef>
-          <a:fillRef idx="1">
-            <a:schemeClr val="accent2"/>
-          </a:fillRef>
-          <a:effectRef idx="0">
-            <a:schemeClr val="accent2"/>
-          </a:effectRef>
-          <a:fontRef idx="minor">
-            <a:schemeClr val="lt1"/>
-          </a:fontRef>
-        </p:style>
-        <p:txBody>
-          <a:bodyPr rtlCol="0" anchor="ctr"/>
-          <a:lstStyle/>
-          <a:p>
-            <a:pPr algn="ctr"/>
-            <a:r>
-              <a:rPr lang="de-CH" sz="1400" dirty="0"/>
-              <a:t>Ö</a:t>
-            </a:r>
-            <a:r>
-              <a:rPr lang="en-CH" sz="1400" dirty="0" err="1"/>
-              <a:t>ffnen</a:t>
-            </a:r>
-            <a:r>
-              <a:rPr lang="en-CH" sz="1400" dirty="0"/>
-              <a:t> von J</a:t>
-            </a:r>
-            <a:r>
-              <a:rPr lang="de-CH" sz="1400" dirty="0"/>
-              <a:t>a</a:t>
-            </a:r>
-            <a:r>
-              <a:rPr lang="en-CH" sz="1400" dirty="0"/>
-              <a:t>b</a:t>
-            </a:r>
-            <a:r>
-              <a:rPr lang="de-CH" sz="1400" dirty="0"/>
-              <a:t>R</a:t>
-            </a:r>
-            <a:r>
-              <a:rPr lang="en-CH" sz="1400" dirty="0"/>
-              <a:t>e</a:t>
-            </a:r>
-            <a:r>
-              <a:rPr lang="de-CH" sz="1400" dirty="0"/>
-              <a:t>f</a:t>
-            </a:r>
-            <a:r>
-              <a:rPr lang="en-CH" sz="1400" dirty="0"/>
-              <a:t>M</a:t>
-            </a:r>
-            <a:r>
-              <a:rPr lang="de-CH" sz="1400" dirty="0"/>
-              <a:t>a</a:t>
-            </a:r>
-            <a:r>
-              <a:rPr lang="en-CH" sz="1400" dirty="0" err="1"/>
-              <a:t>i</a:t>
-            </a:r>
-            <a:r>
-              <a:rPr lang="de-CH" sz="1400" dirty="0"/>
-              <a:t>n</a:t>
-            </a:r>
-            <a:r>
-              <a:rPr lang="en-CH" sz="1400" dirty="0"/>
-              <a:t>.</a:t>
-            </a:r>
-            <a:r>
-              <a:rPr lang="de-CH" sz="1400" dirty="0"/>
-              <a:t>j</a:t>
-            </a:r>
-            <a:r>
-              <a:rPr lang="en-CH" sz="1400" dirty="0"/>
-              <a:t>a</a:t>
-            </a:r>
-            <a:r>
-              <a:rPr lang="de-CH" sz="1400" dirty="0"/>
-              <a:t>v</a:t>
-            </a:r>
-            <a:r>
-              <a:rPr lang="en-CH" sz="1400" dirty="0"/>
-              <a:t>a</a:t>
-            </a:r>
-            <a:endParaRPr lang="de-CH" sz="1400" dirty="0"/>
-          </a:p>
-        </p:txBody>
-      </p:sp>
-      <p:sp>
-        <p:nvSpPr>
-          <p:cNvPr id="6" name="Callout: Line 5">
-            <a:extLst>
-              <a:ext uri="{FF2B5EF4-FFF2-40B4-BE49-F238E27FC236}">
-                <a16:creationId xmlns:a16="http://schemas.microsoft.com/office/drawing/2014/main" id="{96EDB660-2DBF-4411-B5CA-150D7B9D8AAE}"/>
-              </a:ext>
-            </a:extLst>
-          </p:cNvPr>
-          <p:cNvSpPr/>
-          <p:nvPr/>
-        </p:nvSpPr>
-        <p:spPr>
-          <a:xfrm>
-            <a:off x="3718560" y="1926336"/>
-            <a:ext cx="1152144" cy="438912"/>
-          </a:xfrm>
-          <a:prstGeom prst="borderCallout1">
-            <a:avLst/>
-          </a:prstGeom>
-        </p:spPr>
-        <p:style>
-          <a:lnRef idx="2">
-            <a:schemeClr val="accent2">
-              <a:shade val="50000"/>
-            </a:schemeClr>
-          </a:lnRef>
-          <a:fillRef idx="1">
-            <a:schemeClr val="accent2"/>
-          </a:fillRef>
-          <a:effectRef idx="0">
-            <a:schemeClr val="accent2"/>
-          </a:effectRef>
-          <a:fontRef idx="minor">
-            <a:schemeClr val="lt1"/>
-          </a:fontRef>
-        </p:style>
-        <p:txBody>
-          <a:bodyPr rtlCol="0" anchor="ctr"/>
-          <a:lstStyle/>
-          <a:p>
-            <a:pPr algn="ctr"/>
-            <a:r>
-              <a:rPr lang="de-CH" sz="1400" dirty="0"/>
-              <a:t>S</a:t>
-            </a:r>
-            <a:r>
-              <a:rPr lang="en-CH" sz="1400" dirty="0"/>
-              <a:t>t</a:t>
-            </a:r>
-            <a:r>
-              <a:rPr lang="de-CH" sz="1400" dirty="0"/>
-              <a:t>a</a:t>
-            </a:r>
-            <a:r>
-              <a:rPr lang="en-CH" sz="1400" dirty="0"/>
-              <a:t>r</a:t>
-            </a:r>
-            <a:r>
-              <a:rPr lang="de-CH" sz="1400" dirty="0"/>
-              <a:t>t</a:t>
-            </a:r>
-            <a:r>
-              <a:rPr lang="en-CH" sz="1400" dirty="0"/>
-              <a:t>e</a:t>
-            </a:r>
-            <a:r>
-              <a:rPr lang="de-CH" sz="1400" dirty="0"/>
-              <a:t>n</a:t>
-            </a:r>
-            <a:r>
-              <a:rPr lang="en-CH" sz="1400" dirty="0"/>
-              <a:t> </a:t>
-            </a:r>
-            <a:r>
-              <a:rPr lang="de-CH" sz="1400" dirty="0"/>
-              <a:t>v</a:t>
-            </a:r>
-            <a:r>
-              <a:rPr lang="en-CH" sz="1400" dirty="0"/>
-              <a:t>o</a:t>
-            </a:r>
-            <a:r>
-              <a:rPr lang="de-CH" sz="1400" dirty="0"/>
-              <a:t>n</a:t>
-            </a:r>
-            <a:r>
-              <a:rPr lang="en-CH" sz="1400" dirty="0"/>
-              <a:t> Jab</a:t>
-            </a:r>
-            <a:r>
-              <a:rPr lang="de-CH" sz="1400" dirty="0"/>
-              <a:t>R</a:t>
-            </a:r>
-            <a:r>
-              <a:rPr lang="en-CH" sz="1400" dirty="0"/>
-              <a:t>e</a:t>
-            </a:r>
-            <a:r>
-              <a:rPr lang="de-CH" sz="1400" dirty="0"/>
-              <a:t>f</a:t>
-            </a:r>
-          </a:p>
-        </p:txBody>
-      </p:sp>
-      <p:sp>
-        <p:nvSpPr>
           <p:cNvPr id="7" name="Callout: Line 6">
             <a:extLst>
               <a:ext uri="{FF2B5EF4-FFF2-40B4-BE49-F238E27FC236}">
@@ -3802,84 +3591,6 @@
               <a:rPr lang="de-CH" sz="1400" dirty="0"/>
               <a:t>d</a:t>
             </a:r>
-          </a:p>
-        </p:txBody>
-      </p:sp>
-      <p:sp>
-        <p:nvSpPr>
-          <p:cNvPr id="14" name="Callout: Line 13">
-            <a:extLst>
-              <a:ext uri="{FF2B5EF4-FFF2-40B4-BE49-F238E27FC236}">
-                <a16:creationId xmlns:a16="http://schemas.microsoft.com/office/drawing/2014/main" id="{9198F78B-6D5B-4915-AB93-9F554BFBC2C8}"/>
-              </a:ext>
-            </a:extLst>
-          </p:cNvPr>
-          <p:cNvSpPr/>
-          <p:nvPr/>
-        </p:nvSpPr>
-        <p:spPr>
-          <a:xfrm>
-            <a:off x="652272" y="679704"/>
-            <a:ext cx="1524000" cy="438912"/>
-          </a:xfrm>
-          <a:prstGeom prst="borderCallout1">
-            <a:avLst/>
-          </a:prstGeom>
-        </p:spPr>
-        <p:style>
-          <a:lnRef idx="2">
-            <a:schemeClr val="accent6">
-              <a:shade val="50000"/>
-            </a:schemeClr>
-          </a:lnRef>
-          <a:fillRef idx="1">
-            <a:schemeClr val="accent6"/>
-          </a:fillRef>
-          <a:effectRef idx="0">
-            <a:schemeClr val="accent6"/>
-          </a:effectRef>
-          <a:fontRef idx="minor">
-            <a:schemeClr val="lt1"/>
-          </a:fontRef>
-        </p:style>
-        <p:txBody>
-          <a:bodyPr rtlCol="0" anchor="ctr"/>
-          <a:lstStyle/>
-          <a:p>
-            <a:pPr algn="ctr"/>
-            <a:r>
-              <a:rPr lang="de-CH" sz="1400" dirty="0"/>
-              <a:t>P</a:t>
-            </a:r>
-            <a:r>
-              <a:rPr lang="en-CH" sz="1400" dirty="0"/>
-              <a:t>r</a:t>
-            </a:r>
-            <a:r>
-              <a:rPr lang="de-CH" sz="1400" dirty="0"/>
-              <a:t>o</a:t>
-            </a:r>
-            <a:r>
-              <a:rPr lang="en-CH" sz="1400" dirty="0"/>
-              <a:t>j</a:t>
-            </a:r>
-            <a:r>
-              <a:rPr lang="de-CH" sz="1400" dirty="0"/>
-              <a:t>e</a:t>
-            </a:r>
-            <a:r>
-              <a:rPr lang="en-CH" sz="1400" dirty="0"/>
-              <a:t>c</a:t>
-            </a:r>
-            <a:r>
-              <a:rPr lang="de-CH" sz="1400" dirty="0"/>
-              <a:t>t</a:t>
-            </a:r>
-            <a:r>
-              <a:rPr lang="en-CH" sz="1400" dirty="0"/>
-              <a:t> Window</a:t>
-            </a:r>
-            <a:endParaRPr lang="de-CH" sz="1400" dirty="0"/>
           </a:p>
         </p:txBody>
       </p:sp>
@@ -4181,6 +3892,456 @@
     <p:extLst>
       <p:ext uri="{BB962C8B-B14F-4D97-AF65-F5344CB8AC3E}">
         <p14:creationId xmlns:p14="http://schemas.microsoft.com/office/powerpoint/2010/main" val="516172382"/>
+      </p:ext>
+    </p:extLst>
+  </p:cSld>
+  <p:clrMapOvr>
+    <a:masterClrMapping/>
+  </p:clrMapOvr>
+</p:sld>
+</file>
+
+<file path=ppt/slides/slide4.xml><?xml version="1.0" encoding="utf-8"?>
+<p:sld xmlns:a="http://schemas.openxmlformats.org/drawingml/2006/main" xmlns:r="http://schemas.openxmlformats.org/officeDocument/2006/relationships" xmlns:p="http://schemas.openxmlformats.org/presentationml/2006/main">
+  <p:cSld>
+    <p:spTree>
+      <p:nvGrpSpPr>
+        <p:cNvPr id="1" name=""/>
+        <p:cNvGrpSpPr/>
+        <p:nvPr/>
+      </p:nvGrpSpPr>
+      <p:grpSpPr>
+        <a:xfrm>
+          <a:off x="0" y="0"/>
+          <a:ext cx="0" cy="0"/>
+          <a:chOff x="0" y="0"/>
+          <a:chExt cx="0" cy="0"/>
+        </a:xfrm>
+      </p:grpSpPr>
+      <p:pic>
+        <p:nvPicPr>
+          <p:cNvPr id="2" name="Picture 1">
+            <a:extLst>
+              <a:ext uri="{FF2B5EF4-FFF2-40B4-BE49-F238E27FC236}">
+                <a16:creationId xmlns:a16="http://schemas.microsoft.com/office/drawing/2014/main" id="{7EC5C7A5-A82A-4D33-8240-6C58F752FE60}"/>
+              </a:ext>
+            </a:extLst>
+          </p:cNvPr>
+          <p:cNvPicPr>
+            <a:picLocks noChangeAspect="1"/>
+          </p:cNvPicPr>
+          <p:nvPr/>
+        </p:nvPicPr>
+        <p:blipFill>
+          <a:blip r:embed="rId2"/>
+          <a:stretch>
+            <a:fillRect/>
+          </a:stretch>
+        </p:blipFill>
+        <p:spPr>
+          <a:xfrm>
+            <a:off x="3271801" y="872252"/>
+            <a:ext cx="5648398" cy="4967715"/>
+          </a:xfrm>
+          <a:prstGeom prst="rect">
+            <a:avLst/>
+          </a:prstGeom>
+        </p:spPr>
+      </p:pic>
+      <p:sp>
+        <p:nvSpPr>
+          <p:cNvPr id="3" name="Oval 2">
+            <a:extLst>
+              <a:ext uri="{FF2B5EF4-FFF2-40B4-BE49-F238E27FC236}">
+                <a16:creationId xmlns:a16="http://schemas.microsoft.com/office/drawing/2014/main" id="{EA41A35F-1CF6-4660-AA2D-892E9C598B6F}"/>
+              </a:ext>
+            </a:extLst>
+          </p:cNvPr>
+          <p:cNvSpPr/>
+          <p:nvPr/>
+        </p:nvSpPr>
+        <p:spPr>
+          <a:xfrm>
+            <a:off x="4590288" y="3889248"/>
+            <a:ext cx="1024128" cy="231648"/>
+          </a:xfrm>
+          <a:prstGeom prst="ellipse">
+            <a:avLst/>
+          </a:prstGeom>
+          <a:noFill/>
+          <a:ln w="9525" cap="flat" cmpd="sng" algn="ctr">
+            <a:solidFill>
+              <a:srgbClr val="FF0000"/>
+            </a:solidFill>
+            <a:prstDash val="solid"/>
+            <a:round/>
+            <a:headEnd type="none" w="med" len="med"/>
+            <a:tailEnd type="none" w="med" len="med"/>
+          </a:ln>
+        </p:spPr>
+        <p:style>
+          <a:lnRef idx="0">
+            <a:scrgbClr r="0" g="0" b="0"/>
+          </a:lnRef>
+          <a:fillRef idx="0">
+            <a:scrgbClr r="0" g="0" b="0"/>
+          </a:fillRef>
+          <a:effectRef idx="0">
+            <a:scrgbClr r="0" g="0" b="0"/>
+          </a:effectRef>
+          <a:fontRef idx="minor">
+            <a:schemeClr val="accent2"/>
+          </a:fontRef>
+        </p:style>
+        <p:txBody>
+          <a:bodyPr rtlCol="0" anchor="ctr"/>
+          <a:lstStyle/>
+          <a:p>
+            <a:pPr algn="ctr"/>
+            <a:endParaRPr lang="de-CH"/>
+          </a:p>
+        </p:txBody>
+      </p:sp>
+    </p:spTree>
+    <p:extLst>
+      <p:ext uri="{BB962C8B-B14F-4D97-AF65-F5344CB8AC3E}">
+        <p14:creationId xmlns:p14="http://schemas.microsoft.com/office/powerpoint/2010/main" val="104450335"/>
+      </p:ext>
+    </p:extLst>
+  </p:cSld>
+  <p:clrMapOvr>
+    <a:masterClrMapping/>
+  </p:clrMapOvr>
+</p:sld>
+</file>
+
+<file path=ppt/slides/slide5.xml><?xml version="1.0" encoding="utf-8"?>
+<p:sld xmlns:a="http://schemas.openxmlformats.org/drawingml/2006/main" xmlns:r="http://schemas.openxmlformats.org/officeDocument/2006/relationships" xmlns:p="http://schemas.openxmlformats.org/presentationml/2006/main">
+  <p:cSld>
+    <p:spTree>
+      <p:nvGrpSpPr>
+        <p:cNvPr id="1" name=""/>
+        <p:cNvGrpSpPr/>
+        <p:nvPr/>
+      </p:nvGrpSpPr>
+      <p:grpSpPr>
+        <a:xfrm>
+          <a:off x="0" y="0"/>
+          <a:ext cx="0" cy="0"/>
+          <a:chOff x="0" y="0"/>
+          <a:chExt cx="0" cy="0"/>
+        </a:xfrm>
+      </p:grpSpPr>
+      <p:pic>
+        <p:nvPicPr>
+          <p:cNvPr id="2" name="Picture 1">
+            <a:extLst>
+              <a:ext uri="{FF2B5EF4-FFF2-40B4-BE49-F238E27FC236}">
+                <a16:creationId xmlns:a16="http://schemas.microsoft.com/office/drawing/2014/main" id="{23AE52E5-AE6A-42AF-9E41-B704FFEE6FF2}"/>
+              </a:ext>
+            </a:extLst>
+          </p:cNvPr>
+          <p:cNvPicPr>
+            <a:picLocks noChangeAspect="1"/>
+          </p:cNvPicPr>
+          <p:nvPr/>
+        </p:nvPicPr>
+        <p:blipFill>
+          <a:blip r:embed="rId2"/>
+          <a:stretch>
+            <a:fillRect/>
+          </a:stretch>
+        </p:blipFill>
+        <p:spPr>
+          <a:xfrm>
+            <a:off x="2766466" y="843482"/>
+            <a:ext cx="6659067" cy="5171035"/>
+          </a:xfrm>
+          <a:prstGeom prst="rect">
+            <a:avLst/>
+          </a:prstGeom>
+        </p:spPr>
+      </p:pic>
+      <p:sp>
+        <p:nvSpPr>
+          <p:cNvPr id="3" name="Oval 2">
+            <a:extLst>
+              <a:ext uri="{FF2B5EF4-FFF2-40B4-BE49-F238E27FC236}">
+                <a16:creationId xmlns:a16="http://schemas.microsoft.com/office/drawing/2014/main" id="{99B18B65-B033-4E48-9DC1-98D523A4FD99}"/>
+              </a:ext>
+            </a:extLst>
+          </p:cNvPr>
+          <p:cNvSpPr/>
+          <p:nvPr/>
+        </p:nvSpPr>
+        <p:spPr>
+          <a:xfrm>
+            <a:off x="7193280" y="3267456"/>
+            <a:ext cx="2048256" cy="463296"/>
+          </a:xfrm>
+          <a:prstGeom prst="ellipse">
+            <a:avLst/>
+          </a:prstGeom>
+          <a:noFill/>
+          <a:ln w="9525" cap="flat" cmpd="sng" algn="ctr">
+            <a:solidFill>
+              <a:srgbClr val="FF0000"/>
+            </a:solidFill>
+            <a:prstDash val="solid"/>
+            <a:round/>
+            <a:headEnd type="none" w="med" len="med"/>
+            <a:tailEnd type="none" w="med" len="med"/>
+          </a:ln>
+        </p:spPr>
+        <p:style>
+          <a:lnRef idx="0">
+            <a:scrgbClr r="0" g="0" b="0"/>
+          </a:lnRef>
+          <a:fillRef idx="0">
+            <a:scrgbClr r="0" g="0" b="0"/>
+          </a:fillRef>
+          <a:effectRef idx="0">
+            <a:scrgbClr r="0" g="0" b="0"/>
+          </a:effectRef>
+          <a:fontRef idx="minor">
+            <a:schemeClr val="accent2"/>
+          </a:fontRef>
+        </p:style>
+        <p:txBody>
+          <a:bodyPr rtlCol="0" anchor="ctr"/>
+          <a:lstStyle/>
+          <a:p>
+            <a:pPr algn="ctr"/>
+            <a:endParaRPr lang="de-CH" dirty="0"/>
+          </a:p>
+        </p:txBody>
+      </p:sp>
+    </p:spTree>
+    <p:extLst>
+      <p:ext uri="{BB962C8B-B14F-4D97-AF65-F5344CB8AC3E}">
+        <p14:creationId xmlns:p14="http://schemas.microsoft.com/office/powerpoint/2010/main" val="3044058330"/>
+      </p:ext>
+    </p:extLst>
+  </p:cSld>
+  <p:clrMapOvr>
+    <a:masterClrMapping/>
+  </p:clrMapOvr>
+</p:sld>
+</file>
+
+<file path=ppt/slides/slide6.xml><?xml version="1.0" encoding="utf-8"?>
+<p:sld xmlns:a="http://schemas.openxmlformats.org/drawingml/2006/main" xmlns:r="http://schemas.openxmlformats.org/officeDocument/2006/relationships" xmlns:p="http://schemas.openxmlformats.org/presentationml/2006/main">
+  <p:cSld>
+    <p:spTree>
+      <p:nvGrpSpPr>
+        <p:cNvPr id="1" name=""/>
+        <p:cNvGrpSpPr/>
+        <p:nvPr/>
+      </p:nvGrpSpPr>
+      <p:grpSpPr>
+        <a:xfrm>
+          <a:off x="0" y="0"/>
+          <a:ext cx="0" cy="0"/>
+          <a:chOff x="0" y="0"/>
+          <a:chExt cx="0" cy="0"/>
+        </a:xfrm>
+      </p:grpSpPr>
+      <p:pic>
+        <p:nvPicPr>
+          <p:cNvPr id="2" name="Picture 1">
+            <a:extLst>
+              <a:ext uri="{FF2B5EF4-FFF2-40B4-BE49-F238E27FC236}">
+                <a16:creationId xmlns:a16="http://schemas.microsoft.com/office/drawing/2014/main" id="{6B52BCF1-A6C5-4953-98B6-2F76B806B146}"/>
+              </a:ext>
+            </a:extLst>
+          </p:cNvPr>
+          <p:cNvPicPr>
+            <a:picLocks noChangeAspect="1"/>
+          </p:cNvPicPr>
+          <p:nvPr/>
+        </p:nvPicPr>
+        <p:blipFill>
+          <a:blip r:embed="rId2"/>
+          <a:stretch>
+            <a:fillRect/>
+          </a:stretch>
+        </p:blipFill>
+        <p:spPr>
+          <a:xfrm>
+            <a:off x="1894727" y="0"/>
+            <a:ext cx="8402546" cy="6858000"/>
+          </a:xfrm>
+          <a:prstGeom prst="rect">
+            <a:avLst/>
+          </a:prstGeom>
+        </p:spPr>
+      </p:pic>
+      <p:sp>
+        <p:nvSpPr>
+          <p:cNvPr id="4" name="Oval 3">
+            <a:extLst>
+              <a:ext uri="{FF2B5EF4-FFF2-40B4-BE49-F238E27FC236}">
+                <a16:creationId xmlns:a16="http://schemas.microsoft.com/office/drawing/2014/main" id="{4D5DF7A1-A8E6-4794-B649-8F8AC069CE80}"/>
+              </a:ext>
+            </a:extLst>
+          </p:cNvPr>
+          <p:cNvSpPr/>
+          <p:nvPr/>
+        </p:nvSpPr>
+        <p:spPr>
+          <a:xfrm>
+            <a:off x="5041392" y="4022706"/>
+            <a:ext cx="1188720" cy="268877"/>
+          </a:xfrm>
+          <a:prstGeom prst="ellipse">
+            <a:avLst/>
+          </a:prstGeom>
+          <a:noFill/>
+          <a:ln w="9525" cap="flat" cmpd="sng" algn="ctr">
+            <a:solidFill>
+              <a:srgbClr val="FF0000"/>
+            </a:solidFill>
+            <a:prstDash val="solid"/>
+            <a:round/>
+            <a:headEnd type="none" w="med" len="med"/>
+            <a:tailEnd type="none" w="med" len="med"/>
+          </a:ln>
+        </p:spPr>
+        <p:style>
+          <a:lnRef idx="0">
+            <a:scrgbClr r="0" g="0" b="0"/>
+          </a:lnRef>
+          <a:fillRef idx="0">
+            <a:scrgbClr r="0" g="0" b="0"/>
+          </a:fillRef>
+          <a:effectRef idx="0">
+            <a:scrgbClr r="0" g="0" b="0"/>
+          </a:effectRef>
+          <a:fontRef idx="minor">
+            <a:schemeClr val="accent2"/>
+          </a:fontRef>
+        </p:style>
+        <p:txBody>
+          <a:bodyPr rtlCol="0" anchor="ctr"/>
+          <a:lstStyle/>
+          <a:p>
+            <a:pPr algn="ctr"/>
+            <a:endParaRPr lang="de-CH" dirty="0"/>
+          </a:p>
+        </p:txBody>
+      </p:sp>
+      <p:sp>
+        <p:nvSpPr>
+          <p:cNvPr id="5" name="Oval 4">
+            <a:extLst>
+              <a:ext uri="{FF2B5EF4-FFF2-40B4-BE49-F238E27FC236}">
+                <a16:creationId xmlns:a16="http://schemas.microsoft.com/office/drawing/2014/main" id="{381725DB-66A1-4288-AD60-47439E235D4E}"/>
+              </a:ext>
+            </a:extLst>
+          </p:cNvPr>
+          <p:cNvSpPr/>
+          <p:nvPr/>
+        </p:nvSpPr>
+        <p:spPr>
+          <a:xfrm>
+            <a:off x="8668512" y="3973775"/>
+            <a:ext cx="134112" cy="134438"/>
+          </a:xfrm>
+          <a:prstGeom prst="ellipse">
+            <a:avLst/>
+          </a:prstGeom>
+          <a:noFill/>
+          <a:ln w="9525" cap="flat" cmpd="sng" algn="ctr">
+            <a:solidFill>
+              <a:srgbClr val="FF0000"/>
+            </a:solidFill>
+            <a:prstDash val="solid"/>
+            <a:round/>
+            <a:headEnd type="none" w="med" len="med"/>
+            <a:tailEnd type="none" w="med" len="med"/>
+          </a:ln>
+        </p:spPr>
+        <p:style>
+          <a:lnRef idx="0">
+            <a:scrgbClr r="0" g="0" b="0"/>
+          </a:lnRef>
+          <a:fillRef idx="0">
+            <a:scrgbClr r="0" g="0" b="0"/>
+          </a:fillRef>
+          <a:effectRef idx="0">
+            <a:scrgbClr r="0" g="0" b="0"/>
+          </a:effectRef>
+          <a:fontRef idx="minor">
+            <a:schemeClr val="accent2"/>
+          </a:fontRef>
+        </p:style>
+        <p:txBody>
+          <a:bodyPr rtlCol="0" anchor="ctr"/>
+          <a:lstStyle/>
+          <a:p>
+            <a:pPr algn="ctr"/>
+            <a:endParaRPr lang="de-CH" dirty="0"/>
+          </a:p>
+        </p:txBody>
+      </p:sp>
+      <p:sp>
+        <p:nvSpPr>
+          <p:cNvPr id="7" name="Oval 6">
+            <a:extLst>
+              <a:ext uri="{FF2B5EF4-FFF2-40B4-BE49-F238E27FC236}">
+                <a16:creationId xmlns:a16="http://schemas.microsoft.com/office/drawing/2014/main" id="{1F3EF27A-72F1-4312-9343-F0F0F32778CD}"/>
+              </a:ext>
+            </a:extLst>
+          </p:cNvPr>
+          <p:cNvSpPr/>
+          <p:nvPr/>
+        </p:nvSpPr>
+        <p:spPr>
+          <a:xfrm>
+            <a:off x="3803904" y="3620370"/>
+            <a:ext cx="1188720" cy="268877"/>
+          </a:xfrm>
+          <a:prstGeom prst="ellipse">
+            <a:avLst/>
+          </a:prstGeom>
+          <a:noFill/>
+          <a:ln w="9525" cap="flat" cmpd="sng" algn="ctr">
+            <a:solidFill>
+              <a:srgbClr val="FF0000"/>
+            </a:solidFill>
+            <a:prstDash val="solid"/>
+            <a:round/>
+            <a:headEnd type="none" w="med" len="med"/>
+            <a:tailEnd type="none" w="med" len="med"/>
+          </a:ln>
+        </p:spPr>
+        <p:style>
+          <a:lnRef idx="0">
+            <a:scrgbClr r="0" g="0" b="0"/>
+          </a:lnRef>
+          <a:fillRef idx="0">
+            <a:scrgbClr r="0" g="0" b="0"/>
+          </a:fillRef>
+          <a:effectRef idx="0">
+            <a:scrgbClr r="0" g="0" b="0"/>
+          </a:effectRef>
+          <a:fontRef idx="minor">
+            <a:schemeClr val="accent2"/>
+          </a:fontRef>
+        </p:style>
+        <p:txBody>
+          <a:bodyPr rtlCol="0" anchor="ctr"/>
+          <a:lstStyle/>
+          <a:p>
+            <a:pPr algn="ctr"/>
+            <a:endParaRPr lang="de-CH" dirty="0"/>
+          </a:p>
+        </p:txBody>
+      </p:sp>
+    </p:spTree>
+    <p:extLst>
+      <p:ext uri="{BB962C8B-B14F-4D97-AF65-F5344CB8AC3E}">
+        <p14:creationId xmlns:p14="http://schemas.microsoft.com/office/powerpoint/2010/main" val="2184325625"/>
       </p:ext>
     </p:extLst>
   </p:cSld>

</xml_diff>